<commit_message>
fixed call and response method
</commit_message>
<xml_diff>
--- a/tests/test.pptx
+++ b/tests/test.pptx
@@ -7,11 +7,6 @@
   <p:sldIdLst>
     <p:sldId id="256" r:id="rId7"/>
     <p:sldId id="257" r:id="rId8"/>
-    <p:sldId id="258" r:id="rId9"/>
-    <p:sldId id="259" r:id="rId10"/>
-    <p:sldId id="260" r:id="rId11"/>
-    <p:sldId id="261" r:id="rId12"/>
-    <p:sldId id="262" r:id="rId13"/>
   </p:sldIdLst>
   <p:sldSz cx="5486400" cy="3657600" type="screen4x3"/>
   <p:notesSz cx="6858000" cy="9144000"/>
@@ -3138,7 +3133,7 @@
         <p:spPr>
           <a:xfrm>
             <a:off x="0" y="457200"/>
-            <a:ext cx="5486400" cy="3200400"/>
+            <a:ext cx="5486400" cy="0"/>
           </a:xfrm>
           <a:prstGeom prst="rect">
             <a:avLst/>
@@ -3151,6 +3146,7 @@
           </a:bodyPr>
           <a:lstStyle/>
           <a:p>
+            <a:pPr algn="l"/>
             <a:r>
               <a:rPr b="0" i="0" sz="1800" baseline="0">
                 <a:solidFill>
@@ -3158,7 +3154,7 @@
                 </a:solidFill>
                 <a:latin typeface="Segoe UI"/>
               </a:rPr>
-              <a:t>My God, my God, why have you forsaken me? Why</a:t>
+              <a:t>Our Father, who art in heaven, hallowed be thy</a:t>
             </a:r>
             <a:br/>
             <a:r>
@@ -3168,17 +3164,17 @@
                 </a:solidFill>
                 <a:latin typeface="Segoe UI"/>
               </a:rPr>
-              <a:t>are you so far from helping me, from the words of</a:t>
+              <a:t>name:</a:t>
             </a:r>
             <a:br/>
             <a:r>
-              <a:rPr b="0" i="0" sz="1800" baseline="0">
+              <a:rPr b="1" i="0" sz="1800" baseline="0">
                 <a:solidFill>
                   <a:srgbClr val="000000"/>
                 </a:solidFill>
                 <a:latin typeface="Segoe UI"/>
               </a:rPr>
-              <a:t>my groaning? O my God, I cry by day, but you do</a:t>
+              <a:t>Father… My God, my God…</a:t>
             </a:r>
             <a:br/>
             <a:r>
@@ -3188,37 +3184,37 @@
                 </a:solidFill>
                 <a:latin typeface="Segoe UI"/>
               </a:rPr>
-              <a:t>not answer; and by night, but find no rest.</a:t>
+              <a:t>Thy kingdom come, thy will be done, on earth as it</a:t>
             </a:r>
             <a:br/>
             <a:r>
-              <a:rPr b="1" i="0" sz="1800" baseline="0">
+              <a:rPr b="0" i="0" sz="1800" baseline="0">
                 <a:solidFill>
                   <a:srgbClr val="000000"/>
                 </a:solidFill>
                 <a:latin typeface="Segoe UI"/>
               </a:rPr>
-              <a:t>My God, my God, why have you forsaken me?</a:t>
+              <a:t>is in Heaven:</a:t>
             </a:r>
             <a:br/>
             <a:r>
-              <a:rPr b="0" i="0" sz="1800" baseline="0">
+              <a:rPr b="1" i="0" sz="1800" baseline="0">
                 <a:solidFill>
                   <a:srgbClr val="000000"/>
                 </a:solidFill>
                 <a:latin typeface="Segoe UI"/>
               </a:rPr>
-              <a:t>Yet you are holy, enthroned on the praises of Israel.</a:t>
+              <a:t>Behold thy Son… Behold thy mother- today you</a:t>
             </a:r>
             <a:br/>
             <a:r>
-              <a:rPr b="0" i="0" sz="1800" baseline="0">
+              <a:rPr b="1" i="0" sz="1800" baseline="0">
                 <a:solidFill>
                   <a:srgbClr val="000000"/>
                 </a:solidFill>
                 <a:latin typeface="Segoe UI"/>
               </a:rPr>
-              <a:t>In you our ancestors trusted; they trusted, and you</a:t>
+              <a:t>will be with me in Paradise</a:t>
             </a:r>
             <a:br/>
             <a:r>
@@ -3228,7 +3224,7 @@
                 </a:solidFill>
                 <a:latin typeface="Segoe UI"/>
               </a:rPr>
-              <a:t>delivered them.</a:t>
+              <a:t>Give us this day our daily bread:</a:t>
             </a:r>
             <a:br/>
             <a:r>
@@ -3238,7 +3234,7 @@
                 </a:solidFill>
                 <a:latin typeface="Segoe UI"/>
               </a:rPr>
-              <a:t>My God, my God, why have you forsaken me?</a:t>
+              <a:t>I thirst…</a:t>
             </a:r>
             <a:br/>
             <a:r>
@@ -3248,7 +3244,7 @@
                 </a:solidFill>
                 <a:latin typeface="Segoe UI"/>
               </a:rPr>
-              <a:t>To you they cried, and were saved; in you they</a:t>
+              <a:t>Forgive us our trespasses, as we forgive those who</a:t>
             </a:r>
             <a:br/>
             <a:r>
@@ -3258,7 +3254,7 @@
                 </a:solidFill>
                 <a:latin typeface="Segoe UI"/>
               </a:rPr>
-              <a:t>trusted, and were not put to shame. But I am a</a:t>
+              <a:t>trespass against us:</a:t>
             </a:r>
           </a:p>
         </p:txBody>
@@ -3325,158 +3321,6 @@
         <p:spPr>
           <a:xfrm>
             <a:off x="0" y="457200"/>
-            <a:ext cx="5486400" cy="3200400"/>
-          </a:xfrm>
-          <a:prstGeom prst="rect">
-            <a:avLst/>
-          </a:prstGeom>
-          <a:noFill/>
-        </p:spPr>
-        <p:txBody>
-          <a:bodyPr wrap="none">
-            <a:noAutofit/>
-          </a:bodyPr>
-          <a:lstStyle/>
-          <a:p>
-            <a:r>
-              <a:rPr b="0" i="0" sz="1800" baseline="0">
-                <a:solidFill>
-                  <a:srgbClr val="000000"/>
-                </a:solidFill>
-                <a:latin typeface="Segoe UI"/>
-              </a:rPr>
-              <a:t>worm, and not human; scorned by others, and</a:t>
-            </a:r>
-            <a:br/>
-            <a:r>
-              <a:rPr b="0" i="0" sz="1800" baseline="0">
-                <a:solidFill>
-                  <a:srgbClr val="000000"/>
-                </a:solidFill>
-                <a:latin typeface="Segoe UI"/>
-              </a:rPr>
-              <a:t>despised by the people.</a:t>
-            </a:r>
-            <a:br/>
-            <a:r>
-              <a:rPr b="1" i="0" sz="1800" baseline="0">
-                <a:solidFill>
-                  <a:srgbClr val="000000"/>
-                </a:solidFill>
-                <a:latin typeface="Segoe UI"/>
-              </a:rPr>
-              <a:t>My God, my God, why have you forsaken me?</a:t>
-            </a:r>
-            <a:br/>
-            <a:r>
-              <a:rPr b="0" i="0" sz="1800" baseline="0">
-                <a:solidFill>
-                  <a:srgbClr val="000000"/>
-                </a:solidFill>
-                <a:latin typeface="Segoe UI"/>
-              </a:rPr>
-              <a:t>All who see me mock at me; they make mouths at</a:t>
-            </a:r>
-            <a:br/>
-            <a:r>
-              <a:rPr b="0" i="0" sz="1800" baseline="0">
-                <a:solidFill>
-                  <a:srgbClr val="000000"/>
-                </a:solidFill>
-                <a:latin typeface="Segoe UI"/>
-              </a:rPr>
-              <a:t>me, they shake their heads; “commit your cause to</a:t>
-            </a:r>
-            <a:br/>
-            <a:r>
-              <a:rPr b="0" i="0" sz="1800" baseline="0">
-                <a:solidFill>
-                  <a:srgbClr val="000000"/>
-                </a:solidFill>
-                <a:latin typeface="Segoe UI"/>
-              </a:rPr>
-              <a:t>the Lord; let him deliver—let him rescue the one in</a:t>
-            </a:r>
-            <a:br/>
-            <a:r>
-              <a:rPr b="0" i="0" sz="1800" baseline="0">
-                <a:solidFill>
-                  <a:srgbClr val="000000"/>
-                </a:solidFill>
-                <a:latin typeface="Segoe UI"/>
-              </a:rPr>
-              <a:t>whom he delights!”</a:t>
-            </a:r>
-            <a:br/>
-            <a:r>
-              <a:rPr b="1" i="0" sz="1800" baseline="0">
-                <a:solidFill>
-                  <a:srgbClr val="000000"/>
-                </a:solidFill>
-                <a:latin typeface="Segoe UI"/>
-              </a:rPr>
-              <a:t>My God, my God, why have you forsaken me?</a:t>
-            </a:r>
-            <a:br/>
-            <a:r>
-              <a:rPr b="0" i="0" sz="1800" baseline="0">
-                <a:solidFill>
-                  <a:srgbClr val="000000"/>
-                </a:solidFill>
-                <a:latin typeface="Segoe UI"/>
-              </a:rPr>
-              <a:t>Yet it was you who took me from the womb; you</a:t>
-            </a:r>
-            <a:br/>
-            <a:r>
-              <a:rPr b="0" i="0" sz="1800" baseline="0">
-                <a:solidFill>
-                  <a:srgbClr val="000000"/>
-                </a:solidFill>
-                <a:latin typeface="Segoe UI"/>
-              </a:rPr>
-              <a:t>kept me safe on my mother’s breast. On you I was</a:t>
-            </a:r>
-            <a:br/>
-            <a:r>
-              <a:rPr b="0" i="0" sz="1800" baseline="0">
-                <a:solidFill>
-                  <a:srgbClr val="000000"/>
-                </a:solidFill>
-                <a:latin typeface="Segoe UI"/>
-              </a:rPr>
-              <a:t>cast from my birth, and since my mother bore me</a:t>
-            </a:r>
-          </a:p>
-        </p:txBody>
-      </p:sp>
-    </p:spTree>
-  </p:cSld>
-  <p:clrMapOvr>
-    <a:masterClrMapping/>
-  </p:clrMapOvr>
-</p:sld>
-</file>
-
-<file path=ppt/slides/slide3.xml><?xml version="1.0" encoding="utf-8"?>
-<p:sld xmlns:a="http://schemas.openxmlformats.org/drawingml/2006/main" xmlns:p="http://schemas.openxmlformats.org/presentationml/2006/main" xmlns:r="http://schemas.openxmlformats.org/officeDocument/2006/relationships">
-  <p:cSld>
-    <p:spTree>
-      <p:nvGrpSpPr>
-        <p:cNvPr id="1" name=""/>
-        <p:cNvGrpSpPr/>
-        <p:nvPr/>
-      </p:nvGrpSpPr>
-      <p:grpSpPr/>
-      <p:sp>
-        <p:nvSpPr>
-          <p:cNvPr id="2" name="TextBox 1"/>
-          <p:cNvSpPr txBox="1"/>
-          <p:nvPr/>
-        </p:nvSpPr>
-        <p:spPr>
-          <a:xfrm>
-            <a:off x="0" y="91440"/>
             <a:ext cx="5486400" cy="0"/>
           </a:xfrm>
           <a:prstGeom prst="rect">
@@ -3490,59 +3334,35 @@
           </a:bodyPr>
           <a:lstStyle/>
           <a:p>
-            <a:pPr algn="r"/>
-            <a:r>
-              <a:rPr b="1" i="0" sz="1200" baseline="0">
-                <a:solidFill>
-                  <a:srgbClr val="4285F4"/>
+            <a:pPr algn="l"/>
+            <a:r>
+              <a:rPr b="1" i="0" sz="1800" baseline="0">
+                <a:solidFill>
+                  <a:srgbClr val="000000"/>
                 </a:solidFill>
                 <a:latin typeface="Segoe UI"/>
               </a:rPr>
-              <a:t>Psalm</a:t>
-            </a:r>
-          </a:p>
-        </p:txBody>
-      </p:sp>
-      <p:sp>
-        <p:nvSpPr>
-          <p:cNvPr id="3" name="TextBox 2"/>
-          <p:cNvSpPr txBox="1"/>
-          <p:nvPr/>
-        </p:nvSpPr>
-        <p:spPr>
-          <a:xfrm>
-            <a:off x="0" y="457200"/>
-            <a:ext cx="5486400" cy="3200400"/>
-          </a:xfrm>
-          <a:prstGeom prst="rect">
-            <a:avLst/>
-          </a:prstGeom>
-          <a:noFill/>
-        </p:spPr>
-        <p:txBody>
-          <a:bodyPr wrap="none">
-            <a:noAutofit/>
-          </a:bodyPr>
-          <a:lstStyle/>
-          <a:p>
-            <a:r>
-              <a:rPr b="0" i="0" sz="1800" baseline="0">
+              <a:t>Father, forgive them for they know not what they</a:t>
+            </a:r>
+            <a:br/>
+            <a:r>
+              <a:rPr b="1" i="0" sz="1800" baseline="0">
                 <a:solidFill>
                   <a:srgbClr val="000000"/>
                 </a:solidFill>
                 <a:latin typeface="Segoe UI"/>
               </a:rPr>
-              <a:t>you have been my God.</a:t>
+              <a:t>do…</a:t>
             </a:r>
             <a:br/>
             <a:r>
-              <a:rPr b="1" i="0" sz="1800" baseline="0">
+              <a:rPr b="0" i="0" sz="1800" baseline="0">
                 <a:solidFill>
                   <a:srgbClr val="000000"/>
                 </a:solidFill>
                 <a:latin typeface="Segoe UI"/>
               </a:rPr>
-              <a:t>My God, my God, why have you forsaken me?</a:t>
+              <a:t>And lead us not into tempatation, but Deliver Us</a:t>
             </a:r>
             <a:br/>
             <a:r>
@@ -3552,17 +3372,17 @@
                 </a:solidFill>
                 <a:latin typeface="Segoe UI"/>
               </a:rPr>
-              <a:t>Do not be far from me; for trouble is near and there</a:t>
+              <a:t>from Evil:</a:t>
             </a:r>
             <a:br/>
             <a:r>
-              <a:rPr b="0" i="0" sz="1800" baseline="0">
+              <a:rPr b="1" i="0" sz="1800" baseline="0">
                 <a:solidFill>
                   <a:srgbClr val="000000"/>
                 </a:solidFill>
                 <a:latin typeface="Segoe UI"/>
               </a:rPr>
-              <a:t>is no one to help. Many bulls encircle me, strong</a:t>
+              <a:t>My God, my God, why hast thou forsaken me?</a:t>
             </a:r>
             <a:br/>
             <a:r>
@@ -3572,7 +3392,7 @@
                 </a:solidFill>
                 <a:latin typeface="Segoe UI"/>
               </a:rPr>
-              <a:t>Bulls of Bashan surround me; they open wide their</a:t>
+              <a:t>For thine is the kingdom, and the power and the</a:t>
             </a:r>
             <a:br/>
             <a:r>
@@ -3582,7 +3402,7 @@
                 </a:solidFill>
                 <a:latin typeface="Segoe UI"/>
               </a:rPr>
-              <a:t>mouths at me, like a ravening and Roaring Lion.</a:t>
+              <a:t>glory, forever and ever</a:t>
             </a:r>
             <a:br/>
             <a:r>
@@ -3592,755 +3412,17 @@
                 </a:solidFill>
                 <a:latin typeface="Segoe UI"/>
               </a:rPr>
-              <a:t>My God, my God, why have you forsaken me?</a:t>
+              <a:t>Into thy hands I commit my spirit… it is finished.</a:t>
             </a:r>
             <a:br/>
             <a:r>
-              <a:rPr b="0" i="0" sz="1800" baseline="0">
+              <a:rPr b="1" i="0" sz="1800" baseline="0">
                 <a:solidFill>
                   <a:srgbClr val="000000"/>
                 </a:solidFill>
                 <a:latin typeface="Segoe UI"/>
               </a:rPr>
-              <a:t>I am poured out like water, and all my bones are out</a:t>
-            </a:r>
-            <a:br/>
-            <a:r>
-              <a:rPr b="0" i="0" sz="1800" baseline="0">
-                <a:solidFill>
-                  <a:srgbClr val="000000"/>
-                </a:solidFill>
-                <a:latin typeface="Segoe UI"/>
-              </a:rPr>
-              <a:t>of joint; my heart is like wax; it is melted within my</a:t>
-            </a:r>
-            <a:br/>
-            <a:r>
-              <a:rPr b="0" i="0" sz="1800" baseline="0">
-                <a:solidFill>
-                  <a:srgbClr val="000000"/>
-                </a:solidFill>
-                <a:latin typeface="Segoe UI"/>
-              </a:rPr>
-              <a:t>breast; my mouth is dried up like a potsherd, and</a:t>
-            </a:r>
-            <a:br/>
-            <a:r>
-              <a:rPr b="0" i="0" sz="1800" baseline="0">
-                <a:solidFill>
-                  <a:srgbClr val="000000"/>
-                </a:solidFill>
-                <a:latin typeface="Segoe UI"/>
-              </a:rPr>
-              <a:t>my tongue sticks to my jaws; you lay me in the dust</a:t>
-            </a:r>
-          </a:p>
-        </p:txBody>
-      </p:sp>
-    </p:spTree>
-  </p:cSld>
-  <p:clrMapOvr>
-    <a:masterClrMapping/>
-  </p:clrMapOvr>
-</p:sld>
-</file>
-
-<file path=ppt/slides/slide4.xml><?xml version="1.0" encoding="utf-8"?>
-<p:sld xmlns:a="http://schemas.openxmlformats.org/drawingml/2006/main" xmlns:p="http://schemas.openxmlformats.org/presentationml/2006/main" xmlns:r="http://schemas.openxmlformats.org/officeDocument/2006/relationships">
-  <p:cSld>
-    <p:spTree>
-      <p:nvGrpSpPr>
-        <p:cNvPr id="1" name=""/>
-        <p:cNvGrpSpPr/>
-        <p:nvPr/>
-      </p:nvGrpSpPr>
-      <p:grpSpPr/>
-      <p:sp>
-        <p:nvSpPr>
-          <p:cNvPr id="2" name="TextBox 1"/>
-          <p:cNvSpPr txBox="1"/>
-          <p:nvPr/>
-        </p:nvSpPr>
-        <p:spPr>
-          <a:xfrm>
-            <a:off x="0" y="91440"/>
-            <a:ext cx="5486400" cy="0"/>
-          </a:xfrm>
-          <a:prstGeom prst="rect">
-            <a:avLst/>
-          </a:prstGeom>
-          <a:noFill/>
-        </p:spPr>
-        <p:txBody>
-          <a:bodyPr wrap="none">
-            <a:noAutofit/>
-          </a:bodyPr>
-          <a:lstStyle/>
-          <a:p>
-            <a:pPr algn="r"/>
-            <a:r>
-              <a:rPr b="1" i="0" sz="1200" baseline="0">
-                <a:solidFill>
-                  <a:srgbClr val="4285F4"/>
-                </a:solidFill>
-                <a:latin typeface="Segoe UI"/>
-              </a:rPr>
-              <a:t>Psalm</a:t>
-            </a:r>
-          </a:p>
-        </p:txBody>
-      </p:sp>
-      <p:sp>
-        <p:nvSpPr>
-          <p:cNvPr id="3" name="TextBox 2"/>
-          <p:cNvSpPr txBox="1"/>
-          <p:nvPr/>
-        </p:nvSpPr>
-        <p:spPr>
-          <a:xfrm>
-            <a:off x="0" y="457200"/>
-            <a:ext cx="5486400" cy="3200400"/>
-          </a:xfrm>
-          <a:prstGeom prst="rect">
-            <a:avLst/>
-          </a:prstGeom>
-          <a:noFill/>
-        </p:spPr>
-        <p:txBody>
-          <a:bodyPr wrap="none">
-            <a:noAutofit/>
-          </a:bodyPr>
-          <a:lstStyle/>
-          <a:p>
-            <a:r>
-              <a:rPr b="0" i="0" sz="1800" baseline="0">
-                <a:solidFill>
-                  <a:srgbClr val="000000"/>
-                </a:solidFill>
-                <a:latin typeface="Segoe UI"/>
-              </a:rPr>
-              <a:t>of death.</a:t>
-            </a:r>
-            <a:br/>
-            <a:r>
-              <a:rPr b="1" i="0" sz="1800" baseline="0">
-                <a:solidFill>
-                  <a:srgbClr val="000000"/>
-                </a:solidFill>
-                <a:latin typeface="Segoe UI"/>
-              </a:rPr>
-              <a:t>My God, my God, why have you forsaken me?</a:t>
-            </a:r>
-            <a:br/>
-            <a:r>
-              <a:rPr b="0" i="0" sz="1800" baseline="0">
-                <a:solidFill>
-                  <a:srgbClr val="000000"/>
-                </a:solidFill>
-                <a:latin typeface="Segoe UI"/>
-              </a:rPr>
-              <a:t>For dogs are all around me; a company of evildoers</a:t>
-            </a:r>
-            <a:br/>
-            <a:r>
-              <a:rPr b="0" i="0" sz="1800" baseline="0">
-                <a:solidFill>
-                  <a:srgbClr val="000000"/>
-                </a:solidFill>
-                <a:latin typeface="Segoe UI"/>
-              </a:rPr>
-              <a:t>encircles me. My hands and feet have shriveled; I</a:t>
-            </a:r>
-            <a:br/>
-            <a:r>
-              <a:rPr b="0" i="0" sz="1800" baseline="0">
-                <a:solidFill>
-                  <a:srgbClr val="000000"/>
-                </a:solidFill>
-                <a:latin typeface="Segoe UI"/>
-              </a:rPr>
-              <a:t>can count all my bones. They stare and gloat over</a:t>
-            </a:r>
-            <a:br/>
-            <a:r>
-              <a:rPr b="0" i="0" sz="1800" baseline="0">
-                <a:solidFill>
-                  <a:srgbClr val="000000"/>
-                </a:solidFill>
-                <a:latin typeface="Segoe UI"/>
-              </a:rPr>
-              <a:t>me; they divide my clothes among themselves, and</a:t>
-            </a:r>
-            <a:br/>
-            <a:r>
-              <a:rPr b="0" i="0" sz="1800" baseline="0">
-                <a:solidFill>
-                  <a:srgbClr val="000000"/>
-                </a:solidFill>
-                <a:latin typeface="Segoe UI"/>
-              </a:rPr>
-              <a:t>for my clothing they cast lots.</a:t>
-            </a:r>
-            <a:br/>
-            <a:r>
-              <a:rPr b="1" i="0" sz="1800" baseline="0">
-                <a:solidFill>
-                  <a:srgbClr val="000000"/>
-                </a:solidFill>
-                <a:latin typeface="Segoe UI"/>
-              </a:rPr>
-              <a:t>My God, my God, why have you forsaken me?</a:t>
-            </a:r>
-            <a:br/>
-            <a:r>
-              <a:rPr b="0" i="0" sz="1800" baseline="0">
-                <a:solidFill>
-                  <a:srgbClr val="000000"/>
-                </a:solidFill>
-                <a:latin typeface="Segoe UI"/>
-              </a:rPr>
-              <a:t>But you, O Lord, do not be far away! O my help,</a:t>
-            </a:r>
-            <a:br/>
-            <a:r>
-              <a:rPr b="0" i="0" sz="1800" baseline="0">
-                <a:solidFill>
-                  <a:srgbClr val="000000"/>
-                </a:solidFill>
-                <a:latin typeface="Segoe UI"/>
-              </a:rPr>
-              <a:t>come quickly to my aid! Deliver my soul from the</a:t>
-            </a:r>
-            <a:br/>
-            <a:r>
-              <a:rPr b="0" i="0" sz="1800" baseline="0">
-                <a:solidFill>
-                  <a:srgbClr val="000000"/>
-                </a:solidFill>
-                <a:latin typeface="Segoe UI"/>
-              </a:rPr>
-              <a:t>sword, my life from the power of the dog! Save me</a:t>
-            </a:r>
-          </a:p>
-        </p:txBody>
-      </p:sp>
-    </p:spTree>
-  </p:cSld>
-  <p:clrMapOvr>
-    <a:masterClrMapping/>
-  </p:clrMapOvr>
-</p:sld>
-</file>
-
-<file path=ppt/slides/slide5.xml><?xml version="1.0" encoding="utf-8"?>
-<p:sld xmlns:a="http://schemas.openxmlformats.org/drawingml/2006/main" xmlns:p="http://schemas.openxmlformats.org/presentationml/2006/main" xmlns:r="http://schemas.openxmlformats.org/officeDocument/2006/relationships">
-  <p:cSld>
-    <p:spTree>
-      <p:nvGrpSpPr>
-        <p:cNvPr id="1" name=""/>
-        <p:cNvGrpSpPr/>
-        <p:nvPr/>
-      </p:nvGrpSpPr>
-      <p:grpSpPr/>
-      <p:sp>
-        <p:nvSpPr>
-          <p:cNvPr id="2" name="TextBox 1"/>
-          <p:cNvSpPr txBox="1"/>
-          <p:nvPr/>
-        </p:nvSpPr>
-        <p:spPr>
-          <a:xfrm>
-            <a:off x="0" y="91440"/>
-            <a:ext cx="5486400" cy="0"/>
-          </a:xfrm>
-          <a:prstGeom prst="rect">
-            <a:avLst/>
-          </a:prstGeom>
-          <a:noFill/>
-        </p:spPr>
-        <p:txBody>
-          <a:bodyPr wrap="none">
-            <a:noAutofit/>
-          </a:bodyPr>
-          <a:lstStyle/>
-          <a:p>
-            <a:pPr algn="r"/>
-            <a:r>
-              <a:rPr b="1" i="0" sz="1200" baseline="0">
-                <a:solidFill>
-                  <a:srgbClr val="4285F4"/>
-                </a:solidFill>
-                <a:latin typeface="Segoe UI"/>
-              </a:rPr>
-              <a:t>Psalm</a:t>
-            </a:r>
-          </a:p>
-        </p:txBody>
-      </p:sp>
-      <p:sp>
-        <p:nvSpPr>
-          <p:cNvPr id="3" name="TextBox 2"/>
-          <p:cNvSpPr txBox="1"/>
-          <p:nvPr/>
-        </p:nvSpPr>
-        <p:spPr>
-          <a:xfrm>
-            <a:off x="0" y="457200"/>
-            <a:ext cx="5486400" cy="3200400"/>
-          </a:xfrm>
-          <a:prstGeom prst="rect">
-            <a:avLst/>
-          </a:prstGeom>
-          <a:noFill/>
-        </p:spPr>
-        <p:txBody>
-          <a:bodyPr wrap="none">
-            <a:noAutofit/>
-          </a:bodyPr>
-          <a:lstStyle/>
-          <a:p>
-            <a:r>
-              <a:rPr b="0" i="0" sz="1800" baseline="0">
-                <a:solidFill>
-                  <a:srgbClr val="000000"/>
-                </a:solidFill>
-                <a:latin typeface="Segoe UI"/>
-              </a:rPr>
-              <a:t>from the mouth of the lion!</a:t>
-            </a:r>
-            <a:br/>
-            <a:r>
-              <a:rPr b="1" i="0" sz="1800" baseline="0">
-                <a:solidFill>
-                  <a:srgbClr val="000000"/>
-                </a:solidFill>
-                <a:latin typeface="Segoe UI"/>
-              </a:rPr>
-              <a:t>My God, my God, why have you forsaken me?</a:t>
-            </a:r>
-            <a:br/>
-            <a:r>
-              <a:rPr b="0" i="0" sz="1800" baseline="0">
-                <a:solidFill>
-                  <a:srgbClr val="000000"/>
-                </a:solidFill>
-                <a:latin typeface="Segoe UI"/>
-              </a:rPr>
-              <a:t>From the horns of the wild oxen you have rescued</a:t>
-            </a:r>
-            <a:br/>
-            <a:r>
-              <a:rPr b="0" i="0" sz="1800" baseline="0">
-                <a:solidFill>
-                  <a:srgbClr val="000000"/>
-                </a:solidFill>
-                <a:latin typeface="Segoe UI"/>
-              </a:rPr>
-              <a:t>me. I will tell of your name to my brothers and</a:t>
-            </a:r>
-            <a:br/>
-            <a:r>
-              <a:rPr b="0" i="0" sz="1800" baseline="0">
-                <a:solidFill>
-                  <a:srgbClr val="000000"/>
-                </a:solidFill>
-                <a:latin typeface="Segoe UI"/>
-              </a:rPr>
-              <a:t>sisters; in the midst of the congregation I will praise</a:t>
-            </a:r>
-            <a:br/>
-            <a:r>
-              <a:rPr b="0" i="0" sz="1800" baseline="0">
-                <a:solidFill>
-                  <a:srgbClr val="000000"/>
-                </a:solidFill>
-                <a:latin typeface="Segoe UI"/>
-              </a:rPr>
-              <a:t>you: you who fear the Lord, praise him! All you</a:t>
-            </a:r>
-            <a:br/>
-            <a:r>
-              <a:rPr b="0" i="0" sz="1800" baseline="0">
-                <a:solidFill>
-                  <a:srgbClr val="000000"/>
-                </a:solidFill>
-                <a:latin typeface="Segoe UI"/>
-              </a:rPr>
-              <a:t>offspring of Jacob, glorify him; stand in awe of him,</a:t>
-            </a:r>
-            <a:br/>
-            <a:r>
-              <a:rPr b="0" i="0" sz="1800" baseline="0">
-                <a:solidFill>
-                  <a:srgbClr val="000000"/>
-                </a:solidFill>
-                <a:latin typeface="Segoe UI"/>
-              </a:rPr>
-              <a:t>all you offspring of Israel!</a:t>
-            </a:r>
-            <a:br/>
-            <a:r>
-              <a:rPr b="1" i="0" sz="1800" baseline="0">
-                <a:solidFill>
-                  <a:srgbClr val="000000"/>
-                </a:solidFill>
-                <a:latin typeface="Segoe UI"/>
-              </a:rPr>
-              <a:t>My God, my God, why have you forsaken me?</a:t>
-            </a:r>
-            <a:br/>
-            <a:r>
-              <a:rPr b="0" i="0" sz="1800" baseline="0">
-                <a:solidFill>
-                  <a:srgbClr val="000000"/>
-                </a:solidFill>
-                <a:latin typeface="Segoe UI"/>
-              </a:rPr>
-              <a:t>For he did not despise or abhorthe affliction of the</a:t>
-            </a:r>
-            <a:br/>
-            <a:r>
-              <a:rPr b="0" i="0" sz="1800" baseline="0">
-                <a:solidFill>
-                  <a:srgbClr val="000000"/>
-                </a:solidFill>
-                <a:latin typeface="Segoe UI"/>
-              </a:rPr>
-              <a:t>afflicted; he did not hide his face from me, but</a:t>
-            </a:r>
-          </a:p>
-        </p:txBody>
-      </p:sp>
-    </p:spTree>
-  </p:cSld>
-  <p:clrMapOvr>
-    <a:masterClrMapping/>
-  </p:clrMapOvr>
-</p:sld>
-</file>
-
-<file path=ppt/slides/slide6.xml><?xml version="1.0" encoding="utf-8"?>
-<p:sld xmlns:a="http://schemas.openxmlformats.org/drawingml/2006/main" xmlns:p="http://schemas.openxmlformats.org/presentationml/2006/main" xmlns:r="http://schemas.openxmlformats.org/officeDocument/2006/relationships">
-  <p:cSld>
-    <p:spTree>
-      <p:nvGrpSpPr>
-        <p:cNvPr id="1" name=""/>
-        <p:cNvGrpSpPr/>
-        <p:nvPr/>
-      </p:nvGrpSpPr>
-      <p:grpSpPr/>
-      <p:sp>
-        <p:nvSpPr>
-          <p:cNvPr id="2" name="TextBox 1"/>
-          <p:cNvSpPr txBox="1"/>
-          <p:nvPr/>
-        </p:nvSpPr>
-        <p:spPr>
-          <a:xfrm>
-            <a:off x="0" y="91440"/>
-            <a:ext cx="5486400" cy="0"/>
-          </a:xfrm>
-          <a:prstGeom prst="rect">
-            <a:avLst/>
-          </a:prstGeom>
-          <a:noFill/>
-        </p:spPr>
-        <p:txBody>
-          <a:bodyPr wrap="none">
-            <a:noAutofit/>
-          </a:bodyPr>
-          <a:lstStyle/>
-          <a:p>
-            <a:pPr algn="r"/>
-            <a:r>
-              <a:rPr b="1" i="0" sz="1200" baseline="0">
-                <a:solidFill>
-                  <a:srgbClr val="4285F4"/>
-                </a:solidFill>
-                <a:latin typeface="Segoe UI"/>
-              </a:rPr>
-              <a:t>Psalm</a:t>
-            </a:r>
-          </a:p>
-        </p:txBody>
-      </p:sp>
-      <p:sp>
-        <p:nvSpPr>
-          <p:cNvPr id="3" name="TextBox 2"/>
-          <p:cNvSpPr txBox="1"/>
-          <p:nvPr/>
-        </p:nvSpPr>
-        <p:spPr>
-          <a:xfrm>
-            <a:off x="0" y="457200"/>
-            <a:ext cx="5486400" cy="3200400"/>
-          </a:xfrm>
-          <a:prstGeom prst="rect">
-            <a:avLst/>
-          </a:prstGeom>
-          <a:noFill/>
-        </p:spPr>
-        <p:txBody>
-          <a:bodyPr wrap="none">
-            <a:noAutofit/>
-          </a:bodyPr>
-          <a:lstStyle/>
-          <a:p>
-            <a:r>
-              <a:rPr b="0" i="0" sz="1800" baseline="0">
-                <a:solidFill>
-                  <a:srgbClr val="000000"/>
-                </a:solidFill>
-                <a:latin typeface="Segoe UI"/>
-              </a:rPr>
-              <a:t>heard when I cried to him. From you comes my</a:t>
-            </a:r>
-            <a:br/>
-            <a:r>
-              <a:rPr b="0" i="0" sz="1800" baseline="0">
-                <a:solidFill>
-                  <a:srgbClr val="000000"/>
-                </a:solidFill>
-                <a:latin typeface="Segoe UI"/>
-              </a:rPr>
-              <a:t>praise in the great congregation; my vows I will pay</a:t>
-            </a:r>
-            <a:br/>
-            <a:r>
-              <a:rPr b="0" i="0" sz="1800" baseline="0">
-                <a:solidFill>
-                  <a:srgbClr val="000000"/>
-                </a:solidFill>
-                <a:latin typeface="Segoe UI"/>
-              </a:rPr>
-              <a:t>before those who fear him.</a:t>
-            </a:r>
-            <a:br/>
-            <a:r>
-              <a:rPr b="1" i="0" sz="1800" baseline="0">
-                <a:solidFill>
-                  <a:srgbClr val="000000"/>
-                </a:solidFill>
-                <a:latin typeface="Segoe UI"/>
-              </a:rPr>
-              <a:t>My God, my God, why have you forsaken me?</a:t>
-            </a:r>
-            <a:br/>
-            <a:r>
-              <a:rPr b="0" i="0" sz="1800" baseline="0">
-                <a:solidFill>
-                  <a:srgbClr val="000000"/>
-                </a:solidFill>
-                <a:latin typeface="Segoe UI"/>
-              </a:rPr>
-              <a:t>The poor shall eat and be satisfied; those who seek</a:t>
-            </a:r>
-            <a:br/>
-            <a:r>
-              <a:rPr b="0" i="0" sz="1800" baseline="0">
-                <a:solidFill>
-                  <a:srgbClr val="000000"/>
-                </a:solidFill>
-                <a:latin typeface="Segoe UI"/>
-              </a:rPr>
-              <a:t>him shall praise the Lord. May your hearts live</a:t>
-            </a:r>
-            <a:br/>
-            <a:r>
-              <a:rPr b="0" i="0" sz="1800" baseline="0">
-                <a:solidFill>
-                  <a:srgbClr val="000000"/>
-                </a:solidFill>
-                <a:latin typeface="Segoe UI"/>
-              </a:rPr>
-              <a:t>forever! All the ends of the earth shall remember</a:t>
-            </a:r>
-            <a:br/>
-            <a:r>
-              <a:rPr b="0" i="0" sz="1800" baseline="0">
-                <a:solidFill>
-                  <a:srgbClr val="000000"/>
-                </a:solidFill>
-                <a:latin typeface="Segoe UI"/>
-              </a:rPr>
-              <a:t>and turn to the Lord; and all the families of the</a:t>
-            </a:r>
-            <a:br/>
-            <a:r>
-              <a:rPr b="0" i="0" sz="1800" baseline="0">
-                <a:solidFill>
-                  <a:srgbClr val="000000"/>
-                </a:solidFill>
-                <a:latin typeface="Segoe UI"/>
-              </a:rPr>
-              <a:t>nations shall worship before him. For Dominion</a:t>
-            </a:r>
-            <a:br/>
-            <a:r>
-              <a:rPr b="0" i="0" sz="1800" baseline="0">
-                <a:solidFill>
-                  <a:srgbClr val="000000"/>
-                </a:solidFill>
-                <a:latin typeface="Segoe UI"/>
-              </a:rPr>
-              <a:t>belongs to the Lord, and he rules over the nations.</a:t>
-            </a:r>
-            <a:br/>
-            <a:r>
-              <a:rPr b="1" i="0" sz="1800" baseline="0">
-                <a:solidFill>
-                  <a:srgbClr val="000000"/>
-                </a:solidFill>
-                <a:latin typeface="Segoe UI"/>
-              </a:rPr>
-              <a:t>My God, my God, why have you forsaken me?</a:t>
-            </a:r>
-          </a:p>
-        </p:txBody>
-      </p:sp>
-    </p:spTree>
-  </p:cSld>
-  <p:clrMapOvr>
-    <a:masterClrMapping/>
-  </p:clrMapOvr>
-</p:sld>
-</file>
-
-<file path=ppt/slides/slide7.xml><?xml version="1.0" encoding="utf-8"?>
-<p:sld xmlns:a="http://schemas.openxmlformats.org/drawingml/2006/main" xmlns:p="http://schemas.openxmlformats.org/presentationml/2006/main" xmlns:r="http://schemas.openxmlformats.org/officeDocument/2006/relationships">
-  <p:cSld>
-    <p:spTree>
-      <p:nvGrpSpPr>
-        <p:cNvPr id="1" name=""/>
-        <p:cNvGrpSpPr/>
-        <p:nvPr/>
-      </p:nvGrpSpPr>
-      <p:grpSpPr/>
-      <p:sp>
-        <p:nvSpPr>
-          <p:cNvPr id="2" name="TextBox 1"/>
-          <p:cNvSpPr txBox="1"/>
-          <p:nvPr/>
-        </p:nvSpPr>
-        <p:spPr>
-          <a:xfrm>
-            <a:off x="0" y="91440"/>
-            <a:ext cx="5486400" cy="0"/>
-          </a:xfrm>
-          <a:prstGeom prst="rect">
-            <a:avLst/>
-          </a:prstGeom>
-          <a:noFill/>
-        </p:spPr>
-        <p:txBody>
-          <a:bodyPr wrap="none">
-            <a:noAutofit/>
-          </a:bodyPr>
-          <a:lstStyle/>
-          <a:p>
-            <a:pPr algn="r"/>
-            <a:r>
-              <a:rPr b="1" i="0" sz="1200" baseline="0">
-                <a:solidFill>
-                  <a:srgbClr val="4285F4"/>
-                </a:solidFill>
-                <a:latin typeface="Segoe UI"/>
-              </a:rPr>
-              <a:t>Psalm</a:t>
-            </a:r>
-          </a:p>
-        </p:txBody>
-      </p:sp>
-      <p:sp>
-        <p:nvSpPr>
-          <p:cNvPr id="3" name="TextBox 2"/>
-          <p:cNvSpPr txBox="1"/>
-          <p:nvPr/>
-        </p:nvSpPr>
-        <p:spPr>
-          <a:xfrm>
-            <a:off x="0" y="457200"/>
-            <a:ext cx="5486400" cy="3200400"/>
-          </a:xfrm>
-          <a:prstGeom prst="rect">
-            <a:avLst/>
-          </a:prstGeom>
-          <a:noFill/>
-        </p:spPr>
-        <p:txBody>
-          <a:bodyPr wrap="none">
-            <a:noAutofit/>
-          </a:bodyPr>
-          <a:lstStyle/>
-          <a:p>
-            <a:r>
-              <a:rPr b="0" i="0" sz="1800" baseline="0">
-                <a:solidFill>
-                  <a:srgbClr val="000000"/>
-                </a:solidFill>
-                <a:latin typeface="Segoe UI"/>
-              </a:rPr>
-              <a:t>To him, indeed, shall all who sleep in the Earth bow</a:t>
-            </a:r>
-            <a:br/>
-            <a:r>
-              <a:rPr b="0" i="0" sz="1800" baseline="0">
-                <a:solidFill>
-                  <a:srgbClr val="000000"/>
-                </a:solidFill>
-                <a:latin typeface="Segoe UI"/>
-              </a:rPr>
-              <a:t>down; before him shall bow all who go down to the</a:t>
-            </a:r>
-            <a:br/>
-            <a:r>
-              <a:rPr b="0" i="0" sz="1800" baseline="0">
-                <a:solidFill>
-                  <a:srgbClr val="000000"/>
-                </a:solidFill>
-                <a:latin typeface="Segoe UI"/>
-              </a:rPr>
-              <a:t>dust, and I shall live for him. Posterity will serve him;</a:t>
-            </a:r>
-            <a:br/>
-            <a:r>
-              <a:rPr b="0" i="0" sz="1800" baseline="0">
-                <a:solidFill>
-                  <a:srgbClr val="000000"/>
-                </a:solidFill>
-                <a:latin typeface="Segoe UI"/>
-              </a:rPr>
-              <a:t>future generations will be told about the Lord, and</a:t>
-            </a:r>
-            <a:br/>
-            <a:r>
-              <a:rPr b="0" i="0" sz="1800" baseline="0">
-                <a:solidFill>
-                  <a:srgbClr val="000000"/>
-                </a:solidFill>
-                <a:latin typeface="Segoe UI"/>
-              </a:rPr>
-              <a:t>proclaim his deliverance to a people yet unborn,</a:t>
-            </a:r>
-            <a:br/>
-            <a:r>
-              <a:rPr b="0" i="0" sz="1800" baseline="0">
-                <a:solidFill>
-                  <a:srgbClr val="000000"/>
-                </a:solidFill>
-                <a:latin typeface="Segoe UI"/>
-              </a:rPr>
-              <a:t>saying that he has done it.</a:t>
-            </a:r>
-            <a:br/>
-            <a:r>
-              <a:rPr b="1" i="0" sz="1800" baseline="0">
-                <a:solidFill>
-                  <a:srgbClr val="000000"/>
-                </a:solidFill>
-                <a:latin typeface="Segoe UI"/>
-              </a:rPr>
-              <a:t>My God, my God, why have you forsaken me?</a:t>
+              <a:t>Amen.</a:t>
             </a:r>
           </a:p>
         </p:txBody>

</xml_diff>